<commit_message>
updated with bootstrap instructions
</commit_message>
<xml_diff>
--- a/SEDS_content/02.Python.pptx
+++ b/SEDS_content/02.Python.pptx
@@ -4788,13 +4788,8 @@
             </a:r>
             <a:r>
               <a:rPr lang="en-US" sz="3600" dirty="0" smtClean="0"/>
-              <a:t>Tricks</a:t>
-            </a:r>
-            <a:r>
-              <a:rPr lang="en-US" sz="3600" dirty="0" smtClean="0"/>
-              <a:t>) </a:t>
-            </a:r>
-            <a:endParaRPr lang="en-US" sz="3600" dirty="0" smtClean="0"/>
+              <a:t>Tricks) </a:t>
+            </a:r>
           </a:p>
           <a:p>
             <a:r>
@@ -4976,7 +4971,6 @@
               <a:rPr lang="en-US" dirty="0" smtClean="0"/>
               <a:t>Don’t hesitate to jump in with peer support</a:t>
             </a:r>
-            <a:endParaRPr lang="en-US" dirty="0" smtClean="0"/>
           </a:p>
         </p:txBody>
       </p:sp>
@@ -6092,11 +6086,7 @@
           <a:p>
             <a:r>
               <a:rPr lang="en-US" dirty="0" smtClean="0"/>
-              <a:t>Originall</a:t>
-            </a:r>
-            <a:r>
-              <a:rPr lang="en-US" dirty="0" smtClean="0"/>
-              <a:t>y called </a:t>
+              <a:t>Originally called </a:t>
             </a:r>
             <a:r>
               <a:rPr lang="en-US" dirty="0" err="1" smtClean="0"/>
@@ -6106,7 +6096,6 @@
               <a:rPr lang="en-US" dirty="0" smtClean="0"/>
               <a:t> notebooks</a:t>
             </a:r>
-            <a:endParaRPr lang="en-US" dirty="0" smtClean="0"/>
           </a:p>
           <a:p>
             <a:pPr lvl="1"/>
@@ -6537,7 +6526,6 @@
               <a:rPr lang="en-US" dirty="0" smtClean="0"/>
               <a:t>Kill the notebook with Control-C</a:t>
             </a:r>
-            <a:endParaRPr lang="en-US" dirty="0" smtClean="0"/>
           </a:p>
           <a:p>
             <a:pPr lvl="1"/>
@@ -6792,7 +6780,7 @@
         </p:spPr>
         <p:txBody>
           <a:bodyPr>
-            <a:normAutofit/>
+            <a:normAutofit fontScale="92500" lnSpcReduction="20000"/>
           </a:bodyPr>
           <a:lstStyle/>
           <a:p>
@@ -6805,20 +6793,70 @@
             <a:pPr lvl="1"/>
             <a:r>
               <a:rPr lang="en-US" dirty="0" smtClean="0"/>
-              <a:t>Make the directory</a:t>
+              <a:t>Change to a directory where you want the HCEPDB sub-directory to live, e.g. </a:t>
+            </a:r>
+            <a:r>
+              <a:rPr lang="en-US" sz="2600" dirty="0" smtClean="0">
+                <a:latin typeface="Courier New" charset="0"/>
+                <a:ea typeface="Courier New" charset="0"/>
+                <a:cs typeface="Courier New" charset="0"/>
+              </a:rPr>
+              <a:t>cd ~/Desktop</a:t>
             </a:r>
           </a:p>
           <a:p>
             <a:pPr lvl="1"/>
             <a:r>
               <a:rPr lang="en-US" dirty="0" smtClean="0"/>
-              <a:t>Change into the directory</a:t>
-            </a:r>
-          </a:p>
-          <a:p>
+              <a:t>Save the </a:t>
+            </a:r>
+            <a:r>
+              <a:rPr lang="en-US" sz="2600" dirty="0" smtClean="0">
+                <a:latin typeface="Courier New" charset="0"/>
+                <a:ea typeface="Courier New" charset="0"/>
+                <a:cs typeface="Courier New" charset="0"/>
+              </a:rPr>
+              <a:t>01.Intro.setup.sh</a:t>
+            </a:r>
             <a:r>
               <a:rPr lang="en-US" dirty="0" smtClean="0"/>
-              <a:t>Start a </a:t>
+              <a:t> from the syllabus page to the above directory using your web browser</a:t>
+            </a:r>
+          </a:p>
+          <a:p>
+            <a:pPr lvl="1"/>
+            <a:r>
+              <a:rPr lang="en-US" dirty="0" smtClean="0"/>
+              <a:t>Run the setup script with </a:t>
+            </a:r>
+            <a:r>
+              <a:rPr lang="en-US" sz="2600" dirty="0" smtClean="0">
+                <a:latin typeface="Courier New" charset="0"/>
+                <a:ea typeface="Courier New" charset="0"/>
+                <a:cs typeface="Courier New" charset="0"/>
+              </a:rPr>
+              <a:t>bash 01.Intro.setup.sh</a:t>
+            </a:r>
+            <a:endParaRPr lang="en-US" sz="2600" dirty="0" smtClean="0">
+              <a:latin typeface="Courier New" charset="0"/>
+              <a:ea typeface="Courier New" charset="0"/>
+              <a:cs typeface="Courier New" charset="0"/>
+            </a:endParaRPr>
+          </a:p>
+          <a:p>
+            <a:r>
+              <a:rPr lang="en-US" dirty="0" smtClean="0"/>
+              <a:t>Change into the HCEPDB sub-directory</a:t>
+            </a:r>
+          </a:p>
+          <a:p>
+            <a:r>
+              <a:rPr lang="en-US" dirty="0" smtClean="0"/>
+              <a:t>Start </a:t>
+            </a:r>
+            <a:r>
+              <a:rPr lang="en-US" dirty="0" smtClean="0"/>
+              <a:t>a </a:t>
             </a:r>
             <a:r>
               <a:rPr lang="en-US" dirty="0" err="1"/>
@@ -6844,13 +6882,8 @@
             <a:pPr lvl="1"/>
             <a:r>
               <a:rPr lang="en-US" dirty="0" smtClean="0"/>
-              <a:t>User </a:t>
-            </a:r>
-            <a:r>
-              <a:rPr lang="en-US" smtClean="0"/>
-              <a:t>interface tour</a:t>
-            </a:r>
-            <a:endParaRPr lang="en-US" dirty="0" smtClean="0"/>
+              <a:t>User interface tour</a:t>
+            </a:r>
           </a:p>
           <a:p>
             <a:pPr lvl="1"/>

</xml_diff>

<commit_message>
updated based on questions asked in office hours
</commit_message>
<xml_diff>
--- a/SEDS_content/02.Python.pptx
+++ b/SEDS_content/02.Python.pptx
@@ -232,7 +232,7 @@
           <a:p>
             <a:fld id="{08F62E20-B1AA-3442-B8F1-F4A56998389D}" type="datetimeFigureOut">
               <a:rPr lang="en-US" smtClean="0"/>
-              <a:t>1/6/17</a:t>
+              <a:t>1/9/17</a:t>
             </a:fld>
             <a:endParaRPr lang="en-US"/>
           </a:p>
@@ -1361,7 +1361,7 @@
           <a:p>
             <a:fld id="{2691D6E4-0F7A-0249-86EF-226720E50E4C}" type="datetimeFigureOut">
               <a:rPr lang="en-US" smtClean="0"/>
-              <a:t>1/6/17</a:t>
+              <a:t>1/9/17</a:t>
             </a:fld>
             <a:endParaRPr lang="en-US"/>
           </a:p>
@@ -1555,7 +1555,7 @@
           <a:p>
             <a:fld id="{2691D6E4-0F7A-0249-86EF-226720E50E4C}" type="datetimeFigureOut">
               <a:rPr lang="en-US" smtClean="0"/>
-              <a:t>1/6/17</a:t>
+              <a:t>1/9/17</a:t>
             </a:fld>
             <a:endParaRPr lang="en-US"/>
           </a:p>
@@ -1759,7 +1759,7 @@
           <a:p>
             <a:fld id="{2691D6E4-0F7A-0249-86EF-226720E50E4C}" type="datetimeFigureOut">
               <a:rPr lang="en-US" smtClean="0"/>
-              <a:t>1/6/17</a:t>
+              <a:t>1/9/17</a:t>
             </a:fld>
             <a:endParaRPr lang="en-US"/>
           </a:p>
@@ -1953,7 +1953,7 @@
           <a:p>
             <a:fld id="{2691D6E4-0F7A-0249-86EF-226720E50E4C}" type="datetimeFigureOut">
               <a:rPr lang="en-US" smtClean="0"/>
-              <a:t>1/6/17</a:t>
+              <a:t>1/9/17</a:t>
             </a:fld>
             <a:endParaRPr lang="en-US"/>
           </a:p>
@@ -2223,7 +2223,7 @@
           <a:p>
             <a:fld id="{2691D6E4-0F7A-0249-86EF-226720E50E4C}" type="datetimeFigureOut">
               <a:rPr lang="en-US" smtClean="0"/>
-              <a:t>1/6/17</a:t>
+              <a:t>1/9/17</a:t>
             </a:fld>
             <a:endParaRPr lang="en-US"/>
           </a:p>
@@ -2535,7 +2535,7 @@
           <a:p>
             <a:fld id="{2691D6E4-0F7A-0249-86EF-226720E50E4C}" type="datetimeFigureOut">
               <a:rPr lang="en-US" smtClean="0"/>
-              <a:t>1/6/17</a:t>
+              <a:t>1/9/17</a:t>
             </a:fld>
             <a:endParaRPr lang="en-US"/>
           </a:p>
@@ -2981,7 +2981,7 @@
           <a:p>
             <a:fld id="{2691D6E4-0F7A-0249-86EF-226720E50E4C}" type="datetimeFigureOut">
               <a:rPr lang="en-US" smtClean="0"/>
-              <a:t>1/6/17</a:t>
+              <a:t>1/9/17</a:t>
             </a:fld>
             <a:endParaRPr lang="en-US"/>
           </a:p>
@@ -3123,7 +3123,7 @@
           <a:p>
             <a:fld id="{2691D6E4-0F7A-0249-86EF-226720E50E4C}" type="datetimeFigureOut">
               <a:rPr lang="en-US" smtClean="0"/>
-              <a:t>1/6/17</a:t>
+              <a:t>1/9/17</a:t>
             </a:fld>
             <a:endParaRPr lang="en-US"/>
           </a:p>
@@ -3242,7 +3242,7 @@
           <a:p>
             <a:fld id="{2691D6E4-0F7A-0249-86EF-226720E50E4C}" type="datetimeFigureOut">
               <a:rPr lang="en-US" smtClean="0"/>
-              <a:t>1/6/17</a:t>
+              <a:t>1/9/17</a:t>
             </a:fld>
             <a:endParaRPr lang="en-US"/>
           </a:p>
@@ -3543,7 +3543,7 @@
           <a:p>
             <a:fld id="{2691D6E4-0F7A-0249-86EF-226720E50E4C}" type="datetimeFigureOut">
               <a:rPr lang="en-US" smtClean="0"/>
-              <a:t>1/6/17</a:t>
+              <a:t>1/9/17</a:t>
             </a:fld>
             <a:endParaRPr lang="en-US"/>
           </a:p>
@@ -3820,7 +3820,7 @@
           <a:p>
             <a:fld id="{2691D6E4-0F7A-0249-86EF-226720E50E4C}" type="datetimeFigureOut">
               <a:rPr lang="en-US" smtClean="0"/>
-              <a:t>1/6/17</a:t>
+              <a:t>1/9/17</a:t>
             </a:fld>
             <a:endParaRPr lang="en-US"/>
           </a:p>
@@ -6871,11 +6871,7 @@
           <a:p>
             <a:r>
               <a:rPr lang="en-US" dirty="0" smtClean="0"/>
-              <a:t>Setup HCEPDB </a:t>
-            </a:r>
-            <a:r>
-              <a:rPr lang="en-US" dirty="0" smtClean="0"/>
-              <a:t>directory</a:t>
+              <a:t>Setup HCEPDB directory</a:t>
             </a:r>
           </a:p>
           <a:p>
@@ -6884,7 +6880,6 @@
               <a:rPr lang="en-US" dirty="0" smtClean="0"/>
               <a:t>Use the script we created in the first class</a:t>
             </a:r>
-            <a:endParaRPr lang="en-US" dirty="0" smtClean="0"/>
           </a:p>
           <a:p>
             <a:pPr lvl="1"/>
@@ -6934,11 +6929,6 @@
               </a:rPr>
               <a:t>bash 01.Intro.setup.sh</a:t>
             </a:r>
-            <a:endParaRPr lang="en-US" sz="2600" dirty="0" smtClean="0">
-              <a:latin typeface="Courier New" charset="0"/>
-              <a:ea typeface="Courier New" charset="0"/>
-              <a:cs typeface="Courier New" charset="0"/>
-            </a:endParaRPr>
           </a:p>
           <a:p>
             <a:r>
@@ -7096,11 +7086,7 @@
           <a:p>
             <a:r>
               <a:rPr lang="en-US" dirty="0" smtClean="0"/>
-              <a:t>Start </a:t>
-            </a:r>
-            <a:r>
-              <a:rPr lang="en-US" dirty="0" smtClean="0"/>
-              <a:t>a </a:t>
+              <a:t>Start a </a:t>
             </a:r>
             <a:r>
               <a:rPr lang="en-US" dirty="0" err="1"/>

</xml_diff>